<commit_message>
[ADD] HIP23 Vote, telegram msg frame
</commit_message>
<xml_diff>
--- a/send_data/media/HIP/hip23.pptx
+++ b/send_data/media/HIP/hip23.pptx
@@ -214,7 +214,7 @@
           <a:p>
             <a:fld id="{762B48F5-BACC-47D6-A0F7-82FBF9C6BC85}" type="datetimeFigureOut">
               <a:rPr lang="en-US"/>
-              <a:t>12/1/2021</a:t>
+              <a:t>1/27/2022</a:t>
             </a:fld>
             <a:endParaRPr/>
           </a:p>
@@ -379,7 +379,7 @@
           <a:p>
             <a:fld id="{0CB1CD00-5424-4675-AB18-2C419B060449}" type="datetimeFigureOut">
               <a:rPr lang="en-US"/>
-              <a:t>12/1/2021</a:t>
+              <a:t>1/27/2022</a:t>
             </a:fld>
             <a:endParaRPr/>
           </a:p>
@@ -1016,7 +1016,7 @@
           <a:p>
             <a:fld id="{37CC0096-1860-4642-9CD2-0079EA5E7CD1}" type="datetimeFigureOut">
               <a:rPr lang="en-US" smtClean="0"/>
-              <a:t>12/1/2021</a:t>
+              <a:t>1/27/2022</a:t>
             </a:fld>
             <a:endParaRPr lang="en-US"/>
           </a:p>
@@ -1196,7 +1196,7 @@
           <a:p>
             <a:fld id="{37CC0096-1860-4642-9CD2-0079EA5E7CD1}" type="datetimeFigureOut">
               <a:rPr lang="en-US" smtClean="0"/>
-              <a:t>12/1/2021</a:t>
+              <a:t>1/27/2022</a:t>
             </a:fld>
             <a:endParaRPr lang="en-US"/>
           </a:p>
@@ -1370,7 +1370,7 @@
           <a:p>
             <a:fld id="{37CC0096-1860-4642-9CD2-0079EA5E7CD1}" type="datetimeFigureOut">
               <a:rPr lang="en-US" smtClean="0"/>
-              <a:t>12/1/2021</a:t>
+              <a:t>1/27/2022</a:t>
             </a:fld>
             <a:endParaRPr lang="en-US"/>
           </a:p>
@@ -1805,7 +1805,7 @@
           <a:p>
             <a:fld id="{37CC0096-1860-4642-9CD2-0079EA5E7CD1}" type="datetimeFigureOut">
               <a:rPr lang="en-US" smtClean="0"/>
-              <a:t>12/1/2021</a:t>
+              <a:t>1/27/2022</a:t>
             </a:fld>
             <a:endParaRPr lang="en-US"/>
           </a:p>
@@ -2245,7 +2245,7 @@
           <a:p>
             <a:fld id="{37CC0096-1860-4642-9CD2-0079EA5E7CD1}" type="datetimeFigureOut">
               <a:rPr lang="en-US" smtClean="0"/>
-              <a:t>12/1/2021</a:t>
+              <a:t>1/27/2022</a:t>
             </a:fld>
             <a:endParaRPr lang="en-US"/>
           </a:p>
@@ -2363,7 +2363,7 @@
           <a:p>
             <a:fld id="{37CC0096-1860-4642-9CD2-0079EA5E7CD1}" type="datetimeFigureOut">
               <a:rPr lang="en-US" smtClean="0"/>
-              <a:t>12/1/2021</a:t>
+              <a:t>1/27/2022</a:t>
             </a:fld>
             <a:endParaRPr lang="en-US"/>
           </a:p>
@@ -2458,7 +2458,7 @@
           <a:p>
             <a:fld id="{37CC0096-1860-4642-9CD2-0079EA5E7CD1}" type="datetimeFigureOut">
               <a:rPr lang="en-US" smtClean="0"/>
-              <a:t>12/1/2021</a:t>
+              <a:t>1/27/2022</a:t>
             </a:fld>
             <a:endParaRPr lang="en-US"/>
           </a:p>
@@ -2742,7 +2742,7 @@
           <a:p>
             <a:fld id="{37CC0096-1860-4642-9CD2-0079EA5E7CD1}" type="datetimeFigureOut">
               <a:rPr lang="en-US" smtClean="0"/>
-              <a:t>12/1/2021</a:t>
+              <a:t>1/27/2022</a:t>
             </a:fld>
             <a:endParaRPr lang="en-US"/>
           </a:p>
@@ -3055,7 +3055,7 @@
           <a:p>
             <a:fld id="{37CC0096-1860-4642-9CD2-0079EA5E7CD1}" type="datetimeFigureOut">
               <a:rPr lang="en-US" smtClean="0"/>
-              <a:t>12/1/2021</a:t>
+              <a:t>1/27/2022</a:t>
             </a:fld>
             <a:endParaRPr lang="en-US"/>
           </a:p>
@@ -3317,7 +3317,7 @@
             <a:fld id="{37CC0096-1860-4642-9CD2-0079EA5E7CD1}" type="datetimeFigureOut">
               <a:rPr lang="en-US" smtClean="0"/>
               <a:pPr/>
-              <a:t>12/1/2021</a:t>
+              <a:t>1/27/2022</a:t>
             </a:fld>
             <a:endParaRPr lang="en-US"/>
           </a:p>
@@ -4072,6 +4072,31 @@
           <a:p>
             <a:pPr algn="ctr"/>
             <a:r>
+              <a:rPr lang="en-US" sz="13000" b="1" dirty="0" err="1" smtClean="0">
+                <a:ln w="12700">
+                  <a:noFill/>
+                  <a:prstDash val="solid"/>
+                </a:ln>
+                <a:solidFill>
+                  <a:schemeClr val="bg1"/>
+                </a:solidFill>
+                <a:effectLst>
+                  <a:glow rad="203200">
+                    <a:schemeClr val="tx1">
+                      <a:alpha val="68000"/>
+                    </a:schemeClr>
+                  </a:glow>
+                  <a:innerShdw blurRad="63500" dir="4440000">
+                    <a:schemeClr val="tx2">
+                      <a:lumMod val="50000"/>
+                      <a:alpha val="50000"/>
+                    </a:schemeClr>
+                  </a:innerShdw>
+                </a:effectLst>
+              </a:rPr>
+              <a:t>vDao</a:t>
+            </a:r>
+            <a:r>
               <a:rPr lang="en-US" sz="13000" b="1" dirty="0" smtClean="0">
                 <a:ln w="12700">
                   <a:noFill/>
@@ -4094,7 +4119,7 @@
                   </a:innerShdw>
                 </a:effectLst>
               </a:rPr>
-              <a:t>HIP-23</a:t>
+              <a:t> Vote</a:t>
             </a:r>
             <a:endParaRPr lang="en-US" sz="13000" b="1" dirty="0">
               <a:ln w="12700">
@@ -4145,7 +4170,7 @@
           <a:p>
             <a:pPr algn="ctr"/>
             <a:r>
-              <a:rPr lang="en-US" sz="5400" b="1" dirty="0">
+              <a:rPr lang="en-US" sz="5400" b="1" smtClean="0">
                 <a:ln w="12700">
                   <a:noFill/>
                   <a:prstDash val="solid"/>
@@ -4167,8 +4192,55 @@
                   </a:innerShdw>
                 </a:effectLst>
               </a:rPr>
-              <a:t>talk.harmony.one</a:t>
-            </a:r>
+              <a:t>gov</a:t>
+            </a:r>
+            <a:r>
+              <a:rPr lang="en-US" sz="5400" b="1" smtClean="0">
+                <a:ln w="12700">
+                  <a:noFill/>
+                  <a:prstDash val="solid"/>
+                </a:ln>
+                <a:solidFill>
+                  <a:schemeClr val="bg1"/>
+                </a:solidFill>
+                <a:effectLst>
+                  <a:glow rad="203200">
+                    <a:schemeClr val="tx1">
+                      <a:alpha val="68000"/>
+                    </a:schemeClr>
+                  </a:glow>
+                  <a:innerShdw blurRad="63500" dir="4440000">
+                    <a:schemeClr val="tx2">
+                      <a:lumMod val="50000"/>
+                      <a:alpha val="50000"/>
+                    </a:schemeClr>
+                  </a:innerShdw>
+                </a:effectLst>
+              </a:rPr>
+              <a:t>.harmony.one</a:t>
+            </a:r>
+            <a:endParaRPr lang="en-US" sz="5400" b="1" dirty="0">
+              <a:ln w="12700">
+                <a:noFill/>
+                <a:prstDash val="solid"/>
+              </a:ln>
+              <a:solidFill>
+                <a:schemeClr val="bg1"/>
+              </a:solidFill>
+              <a:effectLst>
+                <a:glow rad="203200">
+                  <a:schemeClr val="tx1">
+                    <a:alpha val="68000"/>
+                  </a:schemeClr>
+                </a:glow>
+                <a:innerShdw blurRad="63500" dir="4440000">
+                  <a:schemeClr val="tx2">
+                    <a:lumMod val="50000"/>
+                    <a:alpha val="50000"/>
+                  </a:schemeClr>
+                </a:innerShdw>
+              </a:effectLst>
+            </a:endParaRPr>
           </a:p>
         </p:txBody>
       </p:sp>

</xml_diff>